<commit_message>
[lectures] small fix in the presentation about teamwork
git-svn-id: https://mipt-mips.googlecode.com/svn@55 7b285467-9990-9c3a-2c35-738ad0b76374
</commit_message>
<xml_diff>
--- a/lectures/fpga/Lecture_1__05_Oct__Basics_of_Teamwork_Eng_text__No_audio.pptx
+++ b/lectures/fpga/Lecture_1__05_Oct__Basics_of_Teamwork_Eng_text__No_audio.pptx
@@ -3929,7 +3929,7 @@
         <p:spPr>
           <a:xfrm flipH="1">
             <a:off x="209759" y="2429885"/>
-            <a:ext cx="6947415" cy="984885"/>
+            <a:ext cx="5177699" cy="984885"/>
           </a:xfrm>
         </p:spPr>
         <p:txBody>
@@ -3945,7 +3945,15 @@
             </a:br>
             <a:r>
               <a:rPr lang="en-US" sz="3200" dirty="0" smtClean="0"/>
-              <a:t>Basics of team development on FPGA</a:t>
+              <a:t>Basics of </a:t>
+            </a:r>
+            <a:r>
+              <a:rPr lang="en-US" sz="3200" dirty="0" smtClean="0"/>
+              <a:t>teamwork on </a:t>
+            </a:r>
+            <a:r>
+              <a:rPr lang="en-US" sz="3200" dirty="0" smtClean="0"/>
+              <a:t>FPGA</a:t>
             </a:r>
             <a:endParaRPr lang="en-US" sz="3200" dirty="0"/>
           </a:p>
@@ -12918,6 +12926,24 @@
 </file>
 
 <file path=customXml/item1.xml><?xml version="1.0" encoding="utf-8"?>
+<?mso-contentType ?>
+<FormTemplates xmlns="http://schemas.microsoft.com/sharepoint/v3/contenttype/forms">
+  <Display>DocumentLibraryForm</Display>
+  <Edit>DocumentLibraryForm</Edit>
+  <New>DocumentLibraryForm</New>
+</FormTemplates>
+</file>
+
+<file path=customXml/item2.xml><?xml version="1.0" encoding="utf-8"?>
+<p:properties xmlns:p="http://schemas.microsoft.com/office/2006/metadata/properties" xmlns:xsi="http://www.w3.org/2001/XMLSchema-instance">
+  <documentManagement>
+    <PublishingExpirationDate xmlns="http://schemas.microsoft.com/sharepoint/v3" xsi:nil="true"/>
+    <PublishingStartDate xmlns="http://schemas.microsoft.com/sharepoint/v3" xsi:nil="true"/>
+  </documentManagement>
+</p:properties>
+</file>
+
+<file path=customXml/item3.xml><?xml version="1.0" encoding="utf-8"?>
 <ct:contentTypeSchema xmlns:ct="http://schemas.microsoft.com/office/2006/metadata/contentType" xmlns:ma="http://schemas.microsoft.com/office/2006/metadata/properties/metaAttributes" ct:_="" ma:_="" ma:contentTypeName="Document" ma:contentTypeID="0x0101006F401C71F511A342A8CE5D878AC6A5A2" ma:contentTypeVersion="1" ma:contentTypeDescription="Create a new document." ma:contentTypeScope="" ma:versionID="7780538ac0ddf0014d7399d2d91bbce0">
   <xsd:schema xmlns:xsd="http://www.w3.org/2001/XMLSchema" xmlns:p="http://schemas.microsoft.com/office/2006/metadata/properties" xmlns:ns1="http://schemas.microsoft.com/sharepoint/v3" targetNamespace="http://schemas.microsoft.com/office/2006/metadata/properties" ma:root="true" ma:fieldsID="ddb0c952b897a810c8a4e377cff6bff8" ns1:_="">
     <xsd:import namespace="http://schemas.microsoft.com/sharepoint/v3"/>
@@ -12983,37 +13009,10 @@
 </ct:contentTypeSchema>
 </file>
 
-<file path=customXml/item2.xml><?xml version="1.0" encoding="utf-8"?>
-<p:properties xmlns:p="http://schemas.microsoft.com/office/2006/metadata/properties" xmlns:xsi="http://www.w3.org/2001/XMLSchema-instance">
-  <documentManagement>
-    <PublishingExpirationDate xmlns="http://schemas.microsoft.com/sharepoint/v3" xsi:nil="true"/>
-    <PublishingStartDate xmlns="http://schemas.microsoft.com/sharepoint/v3" xsi:nil="true"/>
-  </documentManagement>
-</p:properties>
-</file>
-
-<file path=customXml/item3.xml><?xml version="1.0" encoding="utf-8"?>
-<?mso-contentType ?>
-<FormTemplates xmlns="http://schemas.microsoft.com/sharepoint/v3/contenttype/forms">
-  <Display>DocumentLibraryForm</Display>
-  <Edit>DocumentLibraryForm</Edit>
-  <New>DocumentLibraryForm</New>
-</FormTemplates>
-</file>
-
 <file path=customXml/itemProps1.xml><?xml version="1.0" encoding="utf-8"?>
-<ds:datastoreItem xmlns:ds="http://schemas.openxmlformats.org/officeDocument/2006/customXml" ds:itemID="{82E76FF6-93BD-4804-AFC1-4178155785E4}">
+<ds:datastoreItem xmlns:ds="http://schemas.openxmlformats.org/officeDocument/2006/customXml" ds:itemID="{C5CC5FB6-44E0-47C0-972B-EBB94824D4B0}">
   <ds:schemaRefs>
-    <ds:schemaRef ds:uri="http://schemas.microsoft.com/office/2006/metadata/contentType"/>
-    <ds:schemaRef ds:uri="http://schemas.microsoft.com/office/2006/metadata/properties/metaAttributes"/>
-    <ds:schemaRef ds:uri="http://www.w3.org/2001/XMLSchema"/>
-    <ds:schemaRef ds:uri="http://schemas.microsoft.com/office/2006/metadata/properties"/>
-    <ds:schemaRef ds:uri="http://schemas.microsoft.com/sharepoint/v3"/>
-    <ds:schemaRef ds:uri="http://schemas.microsoft.com/office/2006/documentManagement/types"/>
-    <ds:schemaRef ds:uri="http://schemas.openxmlformats.org/package/2006/metadata/core-properties"/>
-    <ds:schemaRef ds:uri="http://purl.org/dc/elements/1.1/"/>
-    <ds:schemaRef ds:uri="http://purl.org/dc/terms/"/>
-    <ds:schemaRef ds:uri="http://schemas.microsoft.com/office/internal/2005/internalDocumentation"/>
+    <ds:schemaRef ds:uri="http://schemas.microsoft.com/sharepoint/v3/contenttype/forms"/>
   </ds:schemaRefs>
 </ds:datastoreItem>
 </file>
@@ -13034,9 +13033,18 @@
 </file>
 
 <file path=customXml/itemProps3.xml><?xml version="1.0" encoding="utf-8"?>
-<ds:datastoreItem xmlns:ds="http://schemas.openxmlformats.org/officeDocument/2006/customXml" ds:itemID="{C5CC5FB6-44E0-47C0-972B-EBB94824D4B0}">
+<ds:datastoreItem xmlns:ds="http://schemas.openxmlformats.org/officeDocument/2006/customXml" ds:itemID="{82E76FF6-93BD-4804-AFC1-4178155785E4}">
   <ds:schemaRefs>
-    <ds:schemaRef ds:uri="http://schemas.microsoft.com/sharepoint/v3/contenttype/forms"/>
+    <ds:schemaRef ds:uri="http://schemas.microsoft.com/office/2006/metadata/contentType"/>
+    <ds:schemaRef ds:uri="http://schemas.microsoft.com/office/2006/metadata/properties/metaAttributes"/>
+    <ds:schemaRef ds:uri="http://www.w3.org/2001/XMLSchema"/>
+    <ds:schemaRef ds:uri="http://schemas.microsoft.com/office/2006/metadata/properties"/>
+    <ds:schemaRef ds:uri="http://schemas.microsoft.com/sharepoint/v3"/>
+    <ds:schemaRef ds:uri="http://schemas.microsoft.com/office/2006/documentManagement/types"/>
+    <ds:schemaRef ds:uri="http://schemas.openxmlformats.org/package/2006/metadata/core-properties"/>
+    <ds:schemaRef ds:uri="http://purl.org/dc/elements/1.1/"/>
+    <ds:schemaRef ds:uri="http://purl.org/dc/terms/"/>
+    <ds:schemaRef ds:uri="http://schemas.microsoft.com/office/internal/2005/internalDocumentation"/>
   </ds:schemaRefs>
 </ds:datastoreItem>
 </file>
</xml_diff>